<commit_message>
Add images, styling, and a few small edits to pitch ppt
</commit_message>
<xml_diff>
--- a/pitch slides.PPTX
+++ b/pitch slides.PPTX
@@ -2,7 +2,7 @@
 <file path=ppt/presentation.xml><?xml version="1.0" encoding="utf-8"?>
 <p:presentation xmlns:a="http://schemas.openxmlformats.org/drawingml/2006/main" xmlns:r="http://schemas.openxmlformats.org/officeDocument/2006/relationships" xmlns:p="http://schemas.openxmlformats.org/presentationml/2006/main" saveSubsetFonts="1">
   <p:sldMasterIdLst>
-    <p:sldMasterId id="2147483648" r:id="rId1"/>
+    <p:sldMasterId id="2147483768" r:id="rId1"/>
   </p:sldMasterIdLst>
   <p:sldIdLst>
     <p:sldId id="256" r:id="rId2"/>
@@ -107,6 +107,11 @@
       </a:defRPr>
     </a:lvl9pPr>
   </p:defaultTextStyle>
+  <p:extLst>
+    <p:ext uri="{EFAFB233-063F-42B5-8137-9DF3F51BA10A}">
+      <p15:sldGuideLst xmlns:p15="http://schemas.microsoft.com/office/powerpoint/2012/main"/>
+    </p:ext>
+  </p:extLst>
 </p:presentation>
 </file>
 
@@ -132,7 +137,7 @@
           <p:cNvPr id="2" name="Title 1">
             <a:extLst>
               <a:ext uri="{FF2B5EF4-FFF2-40B4-BE49-F238E27FC236}">
-                <a16:creationId xmlns:a16="http://schemas.microsoft.com/office/drawing/2014/main" id="{CA4477FC-BF24-776C-E770-E1889E3E1F16}"/>
+                <a16:creationId xmlns:a16="http://schemas.microsoft.com/office/drawing/2014/main" id="{DCE35CB8-DCD2-706F-29F0-95AFCA155CA6}"/>
               </a:ext>
             </a:extLst>
           </p:cNvPr>
@@ -169,7 +174,7 @@
           <p:cNvPr id="3" name="Subtitle 2">
             <a:extLst>
               <a:ext uri="{FF2B5EF4-FFF2-40B4-BE49-F238E27FC236}">
-                <a16:creationId xmlns:a16="http://schemas.microsoft.com/office/drawing/2014/main" id="{3E5F2258-BF8F-CD5F-DDEF-A9F3E7E64630}"/>
+                <a16:creationId xmlns:a16="http://schemas.microsoft.com/office/drawing/2014/main" id="{2DCB05E2-8759-B5DD-F523-135E18DB7BDE}"/>
               </a:ext>
             </a:extLst>
           </p:cNvPr>
@@ -239,7 +244,7 @@
           <p:cNvPr id="4" name="Date Placeholder 3">
             <a:extLst>
               <a:ext uri="{FF2B5EF4-FFF2-40B4-BE49-F238E27FC236}">
-                <a16:creationId xmlns:a16="http://schemas.microsoft.com/office/drawing/2014/main" id="{01930A0D-E801-6A72-8687-F4FEFE612342}"/>
+                <a16:creationId xmlns:a16="http://schemas.microsoft.com/office/drawing/2014/main" id="{65B0D807-EA74-84B8-8CD8-1D1D66E7236E}"/>
               </a:ext>
             </a:extLst>
           </p:cNvPr>
@@ -257,7 +262,7 @@
           <a:p>
             <a:fld id="{04973CAB-4A2E-42F7-97F5-9897F8AE48EC}" type="datetimeFigureOut">
               <a:rPr lang="en-US" smtClean="0"/>
-              <a:t>11/3/2023</a:t>
+              <a:t>11/6/23</a:t>
             </a:fld>
             <a:endParaRPr lang="en-US"/>
           </a:p>
@@ -268,7 +273,7 @@
           <p:cNvPr id="5" name="Footer Placeholder 4">
             <a:extLst>
               <a:ext uri="{FF2B5EF4-FFF2-40B4-BE49-F238E27FC236}">
-                <a16:creationId xmlns:a16="http://schemas.microsoft.com/office/drawing/2014/main" id="{1B8DA654-3782-7368-DA75-F60EE97B62BC}"/>
+                <a16:creationId xmlns:a16="http://schemas.microsoft.com/office/drawing/2014/main" id="{0407A6FE-FF38-A8DA-1687-B56A54ED2314}"/>
               </a:ext>
             </a:extLst>
           </p:cNvPr>
@@ -293,7 +298,7 @@
           <p:cNvPr id="6" name="Slide Number Placeholder 5">
             <a:extLst>
               <a:ext uri="{FF2B5EF4-FFF2-40B4-BE49-F238E27FC236}">
-                <a16:creationId xmlns:a16="http://schemas.microsoft.com/office/drawing/2014/main" id="{4061B70C-7F09-662D-8AEC-41C03EBB9179}"/>
+                <a16:creationId xmlns:a16="http://schemas.microsoft.com/office/drawing/2014/main" id="{C5EFD09A-57D1-8DDD-83C0-FA58126BA671}"/>
               </a:ext>
             </a:extLst>
           </p:cNvPr>
@@ -320,7 +325,7 @@
     </p:spTree>
     <p:extLst>
       <p:ext uri="{BB962C8B-B14F-4D97-AF65-F5344CB8AC3E}">
-        <p14:creationId xmlns:p14="http://schemas.microsoft.com/office/powerpoint/2010/main" val="4260830978"/>
+        <p14:creationId xmlns:p14="http://schemas.microsoft.com/office/powerpoint/2010/main" val="2390680016"/>
       </p:ext>
     </p:extLst>
   </p:cSld>
@@ -352,7 +357,7 @@
           <p:cNvPr id="2" name="Title 1">
             <a:extLst>
               <a:ext uri="{FF2B5EF4-FFF2-40B4-BE49-F238E27FC236}">
-                <a16:creationId xmlns:a16="http://schemas.microsoft.com/office/drawing/2014/main" id="{AA7345D9-E621-3937-8416-6A81722C4FDE}"/>
+                <a16:creationId xmlns:a16="http://schemas.microsoft.com/office/drawing/2014/main" id="{D8EF6BFD-0089-6428-3BD2-F87D20DEA393}"/>
               </a:ext>
             </a:extLst>
           </p:cNvPr>
@@ -380,7 +385,7 @@
           <p:cNvPr id="3" name="Vertical Text Placeholder 2">
             <a:extLst>
               <a:ext uri="{FF2B5EF4-FFF2-40B4-BE49-F238E27FC236}">
-                <a16:creationId xmlns:a16="http://schemas.microsoft.com/office/drawing/2014/main" id="{727FB562-30A7-FBC6-6453-3767CF9DAADF}"/>
+                <a16:creationId xmlns:a16="http://schemas.microsoft.com/office/drawing/2014/main" id="{303B472D-C967-B859-79F0-9C63690B3044}"/>
               </a:ext>
             </a:extLst>
           </p:cNvPr>
@@ -437,7 +442,7 @@
           <p:cNvPr id="4" name="Date Placeholder 3">
             <a:extLst>
               <a:ext uri="{FF2B5EF4-FFF2-40B4-BE49-F238E27FC236}">
-                <a16:creationId xmlns:a16="http://schemas.microsoft.com/office/drawing/2014/main" id="{4938488A-7E38-BD0D-40F2-C373F58DC630}"/>
+                <a16:creationId xmlns:a16="http://schemas.microsoft.com/office/drawing/2014/main" id="{C7AE4D47-2A6A-4C59-E41B-03DA203980ED}"/>
               </a:ext>
             </a:extLst>
           </p:cNvPr>
@@ -455,7 +460,7 @@
           <a:p>
             <a:fld id="{04973CAB-4A2E-42F7-97F5-9897F8AE48EC}" type="datetimeFigureOut">
               <a:rPr lang="en-US" smtClean="0"/>
-              <a:t>11/3/2023</a:t>
+              <a:t>11/6/23</a:t>
             </a:fld>
             <a:endParaRPr lang="en-US"/>
           </a:p>
@@ -466,7 +471,7 @@
           <p:cNvPr id="5" name="Footer Placeholder 4">
             <a:extLst>
               <a:ext uri="{FF2B5EF4-FFF2-40B4-BE49-F238E27FC236}">
-                <a16:creationId xmlns:a16="http://schemas.microsoft.com/office/drawing/2014/main" id="{D814DBAD-0618-7643-73A4-9395AA44517D}"/>
+                <a16:creationId xmlns:a16="http://schemas.microsoft.com/office/drawing/2014/main" id="{DF278E97-A4AC-CF5E-A926-B07BD38285C2}"/>
               </a:ext>
             </a:extLst>
           </p:cNvPr>
@@ -491,7 +496,7 @@
           <p:cNvPr id="6" name="Slide Number Placeholder 5">
             <a:extLst>
               <a:ext uri="{FF2B5EF4-FFF2-40B4-BE49-F238E27FC236}">
-                <a16:creationId xmlns:a16="http://schemas.microsoft.com/office/drawing/2014/main" id="{C3BEA03D-5504-81C5-E927-4DA4B5A6CA6B}"/>
+                <a16:creationId xmlns:a16="http://schemas.microsoft.com/office/drawing/2014/main" id="{2E3AAF1C-0FF7-D306-14CB-245AB39109AB}"/>
               </a:ext>
             </a:extLst>
           </p:cNvPr>
@@ -518,7 +523,7 @@
     </p:spTree>
     <p:extLst>
       <p:ext uri="{BB962C8B-B14F-4D97-AF65-F5344CB8AC3E}">
-        <p14:creationId xmlns:p14="http://schemas.microsoft.com/office/powerpoint/2010/main" val="3170354115"/>
+        <p14:creationId xmlns:p14="http://schemas.microsoft.com/office/powerpoint/2010/main" val="770307605"/>
       </p:ext>
     </p:extLst>
   </p:cSld>
@@ -550,7 +555,7 @@
           <p:cNvPr id="2" name="Vertical Title 1">
             <a:extLst>
               <a:ext uri="{FF2B5EF4-FFF2-40B4-BE49-F238E27FC236}">
-                <a16:creationId xmlns:a16="http://schemas.microsoft.com/office/drawing/2014/main" id="{7E429775-0BB2-2BF3-F618-6CEAF7186B09}"/>
+                <a16:creationId xmlns:a16="http://schemas.microsoft.com/office/drawing/2014/main" id="{10502C6E-EBD3-E1CA-B0F0-03E6A9AF5E90}"/>
               </a:ext>
             </a:extLst>
           </p:cNvPr>
@@ -583,7 +588,7 @@
           <p:cNvPr id="3" name="Vertical Text Placeholder 2">
             <a:extLst>
               <a:ext uri="{FF2B5EF4-FFF2-40B4-BE49-F238E27FC236}">
-                <a16:creationId xmlns:a16="http://schemas.microsoft.com/office/drawing/2014/main" id="{5366F630-E434-E445-2ECC-537D8F498980}"/>
+                <a16:creationId xmlns:a16="http://schemas.microsoft.com/office/drawing/2014/main" id="{554DE85D-EEA0-5172-1887-B3C0A7E7E8B6}"/>
               </a:ext>
             </a:extLst>
           </p:cNvPr>
@@ -645,7 +650,7 @@
           <p:cNvPr id="4" name="Date Placeholder 3">
             <a:extLst>
               <a:ext uri="{FF2B5EF4-FFF2-40B4-BE49-F238E27FC236}">
-                <a16:creationId xmlns:a16="http://schemas.microsoft.com/office/drawing/2014/main" id="{DF1D8841-253D-77DA-62F4-5655B329E30C}"/>
+                <a16:creationId xmlns:a16="http://schemas.microsoft.com/office/drawing/2014/main" id="{E253FDCE-D398-D493-77D5-F8313BDC12BE}"/>
               </a:ext>
             </a:extLst>
           </p:cNvPr>
@@ -663,7 +668,7 @@
           <a:p>
             <a:fld id="{04973CAB-4A2E-42F7-97F5-9897F8AE48EC}" type="datetimeFigureOut">
               <a:rPr lang="en-US" smtClean="0"/>
-              <a:t>11/3/2023</a:t>
+              <a:t>11/6/23</a:t>
             </a:fld>
             <a:endParaRPr lang="en-US"/>
           </a:p>
@@ -674,7 +679,7 @@
           <p:cNvPr id="5" name="Footer Placeholder 4">
             <a:extLst>
               <a:ext uri="{FF2B5EF4-FFF2-40B4-BE49-F238E27FC236}">
-                <a16:creationId xmlns:a16="http://schemas.microsoft.com/office/drawing/2014/main" id="{45107817-095F-BAA3-2543-379F47E64CDA}"/>
+                <a16:creationId xmlns:a16="http://schemas.microsoft.com/office/drawing/2014/main" id="{6AD007C3-1E9C-3391-177C-62CFF0893FF1}"/>
               </a:ext>
             </a:extLst>
           </p:cNvPr>
@@ -699,7 +704,7 @@
           <p:cNvPr id="6" name="Slide Number Placeholder 5">
             <a:extLst>
               <a:ext uri="{FF2B5EF4-FFF2-40B4-BE49-F238E27FC236}">
-                <a16:creationId xmlns:a16="http://schemas.microsoft.com/office/drawing/2014/main" id="{C249A57A-0D2E-D2D5-CC20-D36D85083428}"/>
+                <a16:creationId xmlns:a16="http://schemas.microsoft.com/office/drawing/2014/main" id="{3EDBFD19-5859-96A6-CD97-4C6106202087}"/>
               </a:ext>
             </a:extLst>
           </p:cNvPr>
@@ -726,7 +731,7 @@
     </p:spTree>
     <p:extLst>
       <p:ext uri="{BB962C8B-B14F-4D97-AF65-F5344CB8AC3E}">
-        <p14:creationId xmlns:p14="http://schemas.microsoft.com/office/powerpoint/2010/main" val="3446949804"/>
+        <p14:creationId xmlns:p14="http://schemas.microsoft.com/office/powerpoint/2010/main" val="3630015268"/>
       </p:ext>
     </p:extLst>
   </p:cSld>
@@ -758,7 +763,7 @@
           <p:cNvPr id="2" name="Title 1">
             <a:extLst>
               <a:ext uri="{FF2B5EF4-FFF2-40B4-BE49-F238E27FC236}">
-                <a16:creationId xmlns:a16="http://schemas.microsoft.com/office/drawing/2014/main" id="{C20A234B-02BF-FF05-29D7-3E8CF7D44A38}"/>
+                <a16:creationId xmlns:a16="http://schemas.microsoft.com/office/drawing/2014/main" id="{6DB75B7B-1BA1-F3C0-1B6C-E8B5954F620A}"/>
               </a:ext>
             </a:extLst>
           </p:cNvPr>
@@ -786,7 +791,7 @@
           <p:cNvPr id="3" name="Content Placeholder 2">
             <a:extLst>
               <a:ext uri="{FF2B5EF4-FFF2-40B4-BE49-F238E27FC236}">
-                <a16:creationId xmlns:a16="http://schemas.microsoft.com/office/drawing/2014/main" id="{8BD225D1-4BF2-FB72-7033-8F5C09CDA3E2}"/>
+                <a16:creationId xmlns:a16="http://schemas.microsoft.com/office/drawing/2014/main" id="{57850BBE-5E78-C2F6-E1FD-18FBADD2F2BA}"/>
               </a:ext>
             </a:extLst>
           </p:cNvPr>
@@ -843,7 +848,7 @@
           <p:cNvPr id="4" name="Date Placeholder 3">
             <a:extLst>
               <a:ext uri="{FF2B5EF4-FFF2-40B4-BE49-F238E27FC236}">
-                <a16:creationId xmlns:a16="http://schemas.microsoft.com/office/drawing/2014/main" id="{DA3AE559-7B37-2F9C-5998-D6CCC206076D}"/>
+                <a16:creationId xmlns:a16="http://schemas.microsoft.com/office/drawing/2014/main" id="{497F1A66-5E1A-63A7-BDC2-C876D9C27569}"/>
               </a:ext>
             </a:extLst>
           </p:cNvPr>
@@ -861,7 +866,7 @@
           <a:p>
             <a:fld id="{04973CAB-4A2E-42F7-97F5-9897F8AE48EC}" type="datetimeFigureOut">
               <a:rPr lang="en-US" smtClean="0"/>
-              <a:t>11/3/2023</a:t>
+              <a:t>11/6/23</a:t>
             </a:fld>
             <a:endParaRPr lang="en-US"/>
           </a:p>
@@ -872,7 +877,7 @@
           <p:cNvPr id="5" name="Footer Placeholder 4">
             <a:extLst>
               <a:ext uri="{FF2B5EF4-FFF2-40B4-BE49-F238E27FC236}">
-                <a16:creationId xmlns:a16="http://schemas.microsoft.com/office/drawing/2014/main" id="{757BA92F-6D3E-5ABA-99DA-535B586326A5}"/>
+                <a16:creationId xmlns:a16="http://schemas.microsoft.com/office/drawing/2014/main" id="{2A912CC3-08DD-22E4-DF6D-93CD9B0BB2A8}"/>
               </a:ext>
             </a:extLst>
           </p:cNvPr>
@@ -897,7 +902,7 @@
           <p:cNvPr id="6" name="Slide Number Placeholder 5">
             <a:extLst>
               <a:ext uri="{FF2B5EF4-FFF2-40B4-BE49-F238E27FC236}">
-                <a16:creationId xmlns:a16="http://schemas.microsoft.com/office/drawing/2014/main" id="{8DA1D77B-C9C6-8CC3-6166-D0F050520527}"/>
+                <a16:creationId xmlns:a16="http://schemas.microsoft.com/office/drawing/2014/main" id="{80287C99-31C0-2C8E-0816-D8E287966B66}"/>
               </a:ext>
             </a:extLst>
           </p:cNvPr>
@@ -924,7 +929,7 @@
     </p:spTree>
     <p:extLst>
       <p:ext uri="{BB962C8B-B14F-4D97-AF65-F5344CB8AC3E}">
-        <p14:creationId xmlns:p14="http://schemas.microsoft.com/office/powerpoint/2010/main" val="2050891015"/>
+        <p14:creationId xmlns:p14="http://schemas.microsoft.com/office/powerpoint/2010/main" val="186416917"/>
       </p:ext>
     </p:extLst>
   </p:cSld>
@@ -956,7 +961,7 @@
           <p:cNvPr id="2" name="Title 1">
             <a:extLst>
               <a:ext uri="{FF2B5EF4-FFF2-40B4-BE49-F238E27FC236}">
-                <a16:creationId xmlns:a16="http://schemas.microsoft.com/office/drawing/2014/main" id="{DBC07707-7249-D293-CCC9-7BDB7ACAC111}"/>
+                <a16:creationId xmlns:a16="http://schemas.microsoft.com/office/drawing/2014/main" id="{D26F6F49-832B-1516-4E82-28E3ACC207F0}"/>
               </a:ext>
             </a:extLst>
           </p:cNvPr>
@@ -993,7 +998,7 @@
           <p:cNvPr id="3" name="Text Placeholder 2">
             <a:extLst>
               <a:ext uri="{FF2B5EF4-FFF2-40B4-BE49-F238E27FC236}">
-                <a16:creationId xmlns:a16="http://schemas.microsoft.com/office/drawing/2014/main" id="{A2CCDFB5-8395-D3CE-1AA3-09B7C768D8FD}"/>
+                <a16:creationId xmlns:a16="http://schemas.microsoft.com/office/drawing/2014/main" id="{A991B277-6548-E8C3-0C3D-4027D1AF8467}"/>
               </a:ext>
             </a:extLst>
           </p:cNvPr>
@@ -1118,7 +1123,7 @@
           <p:cNvPr id="4" name="Date Placeholder 3">
             <a:extLst>
               <a:ext uri="{FF2B5EF4-FFF2-40B4-BE49-F238E27FC236}">
-                <a16:creationId xmlns:a16="http://schemas.microsoft.com/office/drawing/2014/main" id="{870D015B-A734-0737-C610-F7C407D92AA1}"/>
+                <a16:creationId xmlns:a16="http://schemas.microsoft.com/office/drawing/2014/main" id="{2F9C3589-89A6-928C-6CE5-7C20C11023A5}"/>
               </a:ext>
             </a:extLst>
           </p:cNvPr>
@@ -1136,7 +1141,7 @@
           <a:p>
             <a:fld id="{04973CAB-4A2E-42F7-97F5-9897F8AE48EC}" type="datetimeFigureOut">
               <a:rPr lang="en-US" smtClean="0"/>
-              <a:t>11/3/2023</a:t>
+              <a:t>11/6/23</a:t>
             </a:fld>
             <a:endParaRPr lang="en-US"/>
           </a:p>
@@ -1147,7 +1152,7 @@
           <p:cNvPr id="5" name="Footer Placeholder 4">
             <a:extLst>
               <a:ext uri="{FF2B5EF4-FFF2-40B4-BE49-F238E27FC236}">
-                <a16:creationId xmlns:a16="http://schemas.microsoft.com/office/drawing/2014/main" id="{03514EFE-51BA-64F4-D42F-00FADD9527AC}"/>
+                <a16:creationId xmlns:a16="http://schemas.microsoft.com/office/drawing/2014/main" id="{36ADA6B6-075F-6262-8D0F-6136A05EAD7B}"/>
               </a:ext>
             </a:extLst>
           </p:cNvPr>
@@ -1172,7 +1177,7 @@
           <p:cNvPr id="6" name="Slide Number Placeholder 5">
             <a:extLst>
               <a:ext uri="{FF2B5EF4-FFF2-40B4-BE49-F238E27FC236}">
-                <a16:creationId xmlns:a16="http://schemas.microsoft.com/office/drawing/2014/main" id="{E155694A-594E-CE8B-E889-AD45C2488DA7}"/>
+                <a16:creationId xmlns:a16="http://schemas.microsoft.com/office/drawing/2014/main" id="{B26984E2-C0C3-7026-E07E-89D3B17E38C0}"/>
               </a:ext>
             </a:extLst>
           </p:cNvPr>
@@ -1199,7 +1204,7 @@
     </p:spTree>
     <p:extLst>
       <p:ext uri="{BB962C8B-B14F-4D97-AF65-F5344CB8AC3E}">
-        <p14:creationId xmlns:p14="http://schemas.microsoft.com/office/powerpoint/2010/main" val="533196376"/>
+        <p14:creationId xmlns:p14="http://schemas.microsoft.com/office/powerpoint/2010/main" val="2979808980"/>
       </p:ext>
     </p:extLst>
   </p:cSld>
@@ -1231,7 +1236,7 @@
           <p:cNvPr id="2" name="Title 1">
             <a:extLst>
               <a:ext uri="{FF2B5EF4-FFF2-40B4-BE49-F238E27FC236}">
-                <a16:creationId xmlns:a16="http://schemas.microsoft.com/office/drawing/2014/main" id="{1B3274AE-6BBD-163D-C68F-4BD42B4D940F}"/>
+                <a16:creationId xmlns:a16="http://schemas.microsoft.com/office/drawing/2014/main" id="{8974CACC-89A2-CDF5-4B64-9CE4651525A5}"/>
               </a:ext>
             </a:extLst>
           </p:cNvPr>
@@ -1259,7 +1264,7 @@
           <p:cNvPr id="3" name="Content Placeholder 2">
             <a:extLst>
               <a:ext uri="{FF2B5EF4-FFF2-40B4-BE49-F238E27FC236}">
-                <a16:creationId xmlns:a16="http://schemas.microsoft.com/office/drawing/2014/main" id="{8443E4F4-E7DB-5BF4-C12F-C3D7FB9157FD}"/>
+                <a16:creationId xmlns:a16="http://schemas.microsoft.com/office/drawing/2014/main" id="{93B907B4-C03D-D69F-DADF-4172507572C0}"/>
               </a:ext>
             </a:extLst>
           </p:cNvPr>
@@ -1321,7 +1326,7 @@
           <p:cNvPr id="4" name="Content Placeholder 3">
             <a:extLst>
               <a:ext uri="{FF2B5EF4-FFF2-40B4-BE49-F238E27FC236}">
-                <a16:creationId xmlns:a16="http://schemas.microsoft.com/office/drawing/2014/main" id="{0F2F2E19-1907-22F5-1416-FADE9274A239}"/>
+                <a16:creationId xmlns:a16="http://schemas.microsoft.com/office/drawing/2014/main" id="{453C59DB-ED50-E5B1-A0B7-55D2D9FCF498}"/>
               </a:ext>
             </a:extLst>
           </p:cNvPr>
@@ -1383,7 +1388,7 @@
           <p:cNvPr id="5" name="Date Placeholder 4">
             <a:extLst>
               <a:ext uri="{FF2B5EF4-FFF2-40B4-BE49-F238E27FC236}">
-                <a16:creationId xmlns:a16="http://schemas.microsoft.com/office/drawing/2014/main" id="{3ADF5A3E-1CFB-CB36-680B-194221AF4CB9}"/>
+                <a16:creationId xmlns:a16="http://schemas.microsoft.com/office/drawing/2014/main" id="{B3EC0334-5735-F052-712A-114FBD917873}"/>
               </a:ext>
             </a:extLst>
           </p:cNvPr>
@@ -1401,7 +1406,7 @@
           <a:p>
             <a:fld id="{04973CAB-4A2E-42F7-97F5-9897F8AE48EC}" type="datetimeFigureOut">
               <a:rPr lang="en-US" smtClean="0"/>
-              <a:t>11/3/2023</a:t>
+              <a:t>11/6/23</a:t>
             </a:fld>
             <a:endParaRPr lang="en-US"/>
           </a:p>
@@ -1412,7 +1417,7 @@
           <p:cNvPr id="6" name="Footer Placeholder 5">
             <a:extLst>
               <a:ext uri="{FF2B5EF4-FFF2-40B4-BE49-F238E27FC236}">
-                <a16:creationId xmlns:a16="http://schemas.microsoft.com/office/drawing/2014/main" id="{B00F9096-8C86-E5BF-D7EF-EFEEE1F4D536}"/>
+                <a16:creationId xmlns:a16="http://schemas.microsoft.com/office/drawing/2014/main" id="{25ED726E-7CC0-CFA9-A4D0-9A94425F212A}"/>
               </a:ext>
             </a:extLst>
           </p:cNvPr>
@@ -1437,7 +1442,7 @@
           <p:cNvPr id="7" name="Slide Number Placeholder 6">
             <a:extLst>
               <a:ext uri="{FF2B5EF4-FFF2-40B4-BE49-F238E27FC236}">
-                <a16:creationId xmlns:a16="http://schemas.microsoft.com/office/drawing/2014/main" id="{CDF362D8-E30A-2C2B-734A-857675493C2E}"/>
+                <a16:creationId xmlns:a16="http://schemas.microsoft.com/office/drawing/2014/main" id="{2C661DB6-DCBF-4BA8-2043-67E421ED1419}"/>
               </a:ext>
             </a:extLst>
           </p:cNvPr>
@@ -1464,7 +1469,7 @@
     </p:spTree>
     <p:extLst>
       <p:ext uri="{BB962C8B-B14F-4D97-AF65-F5344CB8AC3E}">
-        <p14:creationId xmlns:p14="http://schemas.microsoft.com/office/powerpoint/2010/main" val="200229266"/>
+        <p14:creationId xmlns:p14="http://schemas.microsoft.com/office/powerpoint/2010/main" val="2925704181"/>
       </p:ext>
     </p:extLst>
   </p:cSld>
@@ -1496,7 +1501,7 @@
           <p:cNvPr id="2" name="Title 1">
             <a:extLst>
               <a:ext uri="{FF2B5EF4-FFF2-40B4-BE49-F238E27FC236}">
-                <a16:creationId xmlns:a16="http://schemas.microsoft.com/office/drawing/2014/main" id="{2D3497BC-9ADA-E873-2326-68671E1556E4}"/>
+                <a16:creationId xmlns:a16="http://schemas.microsoft.com/office/drawing/2014/main" id="{DE45CA65-07A3-41CC-4599-3B0C9C8F1255}"/>
               </a:ext>
             </a:extLst>
           </p:cNvPr>
@@ -1529,7 +1534,7 @@
           <p:cNvPr id="3" name="Text Placeholder 2">
             <a:extLst>
               <a:ext uri="{FF2B5EF4-FFF2-40B4-BE49-F238E27FC236}">
-                <a16:creationId xmlns:a16="http://schemas.microsoft.com/office/drawing/2014/main" id="{78852204-2DAA-AEA5-7F40-A8197D117DBB}"/>
+                <a16:creationId xmlns:a16="http://schemas.microsoft.com/office/drawing/2014/main" id="{B667C50C-9FE7-8F4F-37D4-ADE945FD0375}"/>
               </a:ext>
             </a:extLst>
           </p:cNvPr>
@@ -1600,7 +1605,7 @@
           <p:cNvPr id="4" name="Content Placeholder 3">
             <a:extLst>
               <a:ext uri="{FF2B5EF4-FFF2-40B4-BE49-F238E27FC236}">
-                <a16:creationId xmlns:a16="http://schemas.microsoft.com/office/drawing/2014/main" id="{21FB19AA-D0DD-6757-4649-6AA6BD185D17}"/>
+                <a16:creationId xmlns:a16="http://schemas.microsoft.com/office/drawing/2014/main" id="{E616A604-A568-22F9-45AC-F88D3B9F1753}"/>
               </a:ext>
             </a:extLst>
           </p:cNvPr>
@@ -1662,7 +1667,7 @@
           <p:cNvPr id="5" name="Text Placeholder 4">
             <a:extLst>
               <a:ext uri="{FF2B5EF4-FFF2-40B4-BE49-F238E27FC236}">
-                <a16:creationId xmlns:a16="http://schemas.microsoft.com/office/drawing/2014/main" id="{393F07A6-4212-F678-B74C-6FE279D0836F}"/>
+                <a16:creationId xmlns:a16="http://schemas.microsoft.com/office/drawing/2014/main" id="{25F74C54-816A-727B-9A3E-425CBCFE4FD7}"/>
               </a:ext>
             </a:extLst>
           </p:cNvPr>
@@ -1733,7 +1738,7 @@
           <p:cNvPr id="6" name="Content Placeholder 5">
             <a:extLst>
               <a:ext uri="{FF2B5EF4-FFF2-40B4-BE49-F238E27FC236}">
-                <a16:creationId xmlns:a16="http://schemas.microsoft.com/office/drawing/2014/main" id="{6496BAA2-5BBB-8586-1648-B12D896C59A8}"/>
+                <a16:creationId xmlns:a16="http://schemas.microsoft.com/office/drawing/2014/main" id="{467363E3-CD25-8996-1644-588420660AD5}"/>
               </a:ext>
             </a:extLst>
           </p:cNvPr>
@@ -1795,7 +1800,7 @@
           <p:cNvPr id="7" name="Date Placeholder 6">
             <a:extLst>
               <a:ext uri="{FF2B5EF4-FFF2-40B4-BE49-F238E27FC236}">
-                <a16:creationId xmlns:a16="http://schemas.microsoft.com/office/drawing/2014/main" id="{BEB5AEEF-4759-4930-8677-3D14F4828E63}"/>
+                <a16:creationId xmlns:a16="http://schemas.microsoft.com/office/drawing/2014/main" id="{8EE900EE-3AB1-9E63-BACF-8AAB03C5D875}"/>
               </a:ext>
             </a:extLst>
           </p:cNvPr>
@@ -1813,7 +1818,7 @@
           <a:p>
             <a:fld id="{04973CAB-4A2E-42F7-97F5-9897F8AE48EC}" type="datetimeFigureOut">
               <a:rPr lang="en-US" smtClean="0"/>
-              <a:t>11/3/2023</a:t>
+              <a:t>11/6/23</a:t>
             </a:fld>
             <a:endParaRPr lang="en-US"/>
           </a:p>
@@ -1824,7 +1829,7 @@
           <p:cNvPr id="8" name="Footer Placeholder 7">
             <a:extLst>
               <a:ext uri="{FF2B5EF4-FFF2-40B4-BE49-F238E27FC236}">
-                <a16:creationId xmlns:a16="http://schemas.microsoft.com/office/drawing/2014/main" id="{2F2FB352-9CCE-C682-BA8F-B59CEB76D9AD}"/>
+                <a16:creationId xmlns:a16="http://schemas.microsoft.com/office/drawing/2014/main" id="{2E021AFE-F84D-B8C2-44E9-D43768696757}"/>
               </a:ext>
             </a:extLst>
           </p:cNvPr>
@@ -1849,7 +1854,7 @@
           <p:cNvPr id="9" name="Slide Number Placeholder 8">
             <a:extLst>
               <a:ext uri="{FF2B5EF4-FFF2-40B4-BE49-F238E27FC236}">
-                <a16:creationId xmlns:a16="http://schemas.microsoft.com/office/drawing/2014/main" id="{0A719C3F-78B0-2C87-680A-DC9DA214AFD1}"/>
+                <a16:creationId xmlns:a16="http://schemas.microsoft.com/office/drawing/2014/main" id="{5D107B6D-3969-2CBB-8412-64B3F23DB759}"/>
               </a:ext>
             </a:extLst>
           </p:cNvPr>
@@ -1876,7 +1881,7 @@
     </p:spTree>
     <p:extLst>
       <p:ext uri="{BB962C8B-B14F-4D97-AF65-F5344CB8AC3E}">
-        <p14:creationId xmlns:p14="http://schemas.microsoft.com/office/powerpoint/2010/main" val="3965976678"/>
+        <p14:creationId xmlns:p14="http://schemas.microsoft.com/office/powerpoint/2010/main" val="1627265627"/>
       </p:ext>
     </p:extLst>
   </p:cSld>
@@ -1908,7 +1913,7 @@
           <p:cNvPr id="2" name="Title 1">
             <a:extLst>
               <a:ext uri="{FF2B5EF4-FFF2-40B4-BE49-F238E27FC236}">
-                <a16:creationId xmlns:a16="http://schemas.microsoft.com/office/drawing/2014/main" id="{05841B0C-337D-E638-6250-D6239040B8CD}"/>
+                <a16:creationId xmlns:a16="http://schemas.microsoft.com/office/drawing/2014/main" id="{A0014E1F-A4F5-17A5-8202-8012212FC7C2}"/>
               </a:ext>
             </a:extLst>
           </p:cNvPr>
@@ -1936,7 +1941,7 @@
           <p:cNvPr id="3" name="Date Placeholder 2">
             <a:extLst>
               <a:ext uri="{FF2B5EF4-FFF2-40B4-BE49-F238E27FC236}">
-                <a16:creationId xmlns:a16="http://schemas.microsoft.com/office/drawing/2014/main" id="{E3C37357-FE1F-5A56-C0C3-EDA15B996485}"/>
+                <a16:creationId xmlns:a16="http://schemas.microsoft.com/office/drawing/2014/main" id="{9ECEC629-6410-8935-F6C1-D2B21CFDC6ED}"/>
               </a:ext>
             </a:extLst>
           </p:cNvPr>
@@ -1954,7 +1959,7 @@
           <a:p>
             <a:fld id="{04973CAB-4A2E-42F7-97F5-9897F8AE48EC}" type="datetimeFigureOut">
               <a:rPr lang="en-US" smtClean="0"/>
-              <a:t>11/3/2023</a:t>
+              <a:t>11/6/23</a:t>
             </a:fld>
             <a:endParaRPr lang="en-US"/>
           </a:p>
@@ -1965,7 +1970,7 @@
           <p:cNvPr id="4" name="Footer Placeholder 3">
             <a:extLst>
               <a:ext uri="{FF2B5EF4-FFF2-40B4-BE49-F238E27FC236}">
-                <a16:creationId xmlns:a16="http://schemas.microsoft.com/office/drawing/2014/main" id="{E3317A13-BD23-B729-35C0-B50D460002D9}"/>
+                <a16:creationId xmlns:a16="http://schemas.microsoft.com/office/drawing/2014/main" id="{E9546413-D71C-54A4-D15E-99898C1CD7D0}"/>
               </a:ext>
             </a:extLst>
           </p:cNvPr>
@@ -1990,7 +1995,7 @@
           <p:cNvPr id="5" name="Slide Number Placeholder 4">
             <a:extLst>
               <a:ext uri="{FF2B5EF4-FFF2-40B4-BE49-F238E27FC236}">
-                <a16:creationId xmlns:a16="http://schemas.microsoft.com/office/drawing/2014/main" id="{73D304DA-2012-1AB5-FE7F-E8CB56823D24}"/>
+                <a16:creationId xmlns:a16="http://schemas.microsoft.com/office/drawing/2014/main" id="{43FAEB29-7A26-657B-9A0C-D3438109B86E}"/>
               </a:ext>
             </a:extLst>
           </p:cNvPr>
@@ -2017,7 +2022,7 @@
     </p:spTree>
     <p:extLst>
       <p:ext uri="{BB962C8B-B14F-4D97-AF65-F5344CB8AC3E}">
-        <p14:creationId xmlns:p14="http://schemas.microsoft.com/office/powerpoint/2010/main" val="3541393290"/>
+        <p14:creationId xmlns:p14="http://schemas.microsoft.com/office/powerpoint/2010/main" val="3282488938"/>
       </p:ext>
     </p:extLst>
   </p:cSld>
@@ -2049,7 +2054,7 @@
           <p:cNvPr id="2" name="Date Placeholder 1">
             <a:extLst>
               <a:ext uri="{FF2B5EF4-FFF2-40B4-BE49-F238E27FC236}">
-                <a16:creationId xmlns:a16="http://schemas.microsoft.com/office/drawing/2014/main" id="{8892DC20-2DC8-A13D-5084-A74DB0C12494}"/>
+                <a16:creationId xmlns:a16="http://schemas.microsoft.com/office/drawing/2014/main" id="{AC2F264B-27B9-639A-682C-3236C92B8FFB}"/>
               </a:ext>
             </a:extLst>
           </p:cNvPr>
@@ -2067,7 +2072,7 @@
           <a:p>
             <a:fld id="{04973CAB-4A2E-42F7-97F5-9897F8AE48EC}" type="datetimeFigureOut">
               <a:rPr lang="en-US" smtClean="0"/>
-              <a:t>11/3/2023</a:t>
+              <a:t>11/6/23</a:t>
             </a:fld>
             <a:endParaRPr lang="en-US"/>
           </a:p>
@@ -2078,7 +2083,7 @@
           <p:cNvPr id="3" name="Footer Placeholder 2">
             <a:extLst>
               <a:ext uri="{FF2B5EF4-FFF2-40B4-BE49-F238E27FC236}">
-                <a16:creationId xmlns:a16="http://schemas.microsoft.com/office/drawing/2014/main" id="{CF6FDF30-28E9-844A-3B3E-71E5B5E306BE}"/>
+                <a16:creationId xmlns:a16="http://schemas.microsoft.com/office/drawing/2014/main" id="{81FAC580-9A7E-8B64-6354-E994C630ABCA}"/>
               </a:ext>
             </a:extLst>
           </p:cNvPr>
@@ -2103,7 +2108,7 @@
           <p:cNvPr id="4" name="Slide Number Placeholder 3">
             <a:extLst>
               <a:ext uri="{FF2B5EF4-FFF2-40B4-BE49-F238E27FC236}">
-                <a16:creationId xmlns:a16="http://schemas.microsoft.com/office/drawing/2014/main" id="{AA05AD30-B63E-CC0B-D943-846B8129FB86}"/>
+                <a16:creationId xmlns:a16="http://schemas.microsoft.com/office/drawing/2014/main" id="{6A1491F0-6A71-3CAE-0527-EDD1BDC52D1A}"/>
               </a:ext>
             </a:extLst>
           </p:cNvPr>
@@ -2130,7 +2135,7 @@
     </p:spTree>
     <p:extLst>
       <p:ext uri="{BB962C8B-B14F-4D97-AF65-F5344CB8AC3E}">
-        <p14:creationId xmlns:p14="http://schemas.microsoft.com/office/powerpoint/2010/main" val="3267844589"/>
+        <p14:creationId xmlns:p14="http://schemas.microsoft.com/office/powerpoint/2010/main" val="1021583297"/>
       </p:ext>
     </p:extLst>
   </p:cSld>
@@ -2162,7 +2167,7 @@
           <p:cNvPr id="2" name="Title 1">
             <a:extLst>
               <a:ext uri="{FF2B5EF4-FFF2-40B4-BE49-F238E27FC236}">
-                <a16:creationId xmlns:a16="http://schemas.microsoft.com/office/drawing/2014/main" id="{0C3373FA-9DA4-2C6E-2C81-201718A960B0}"/>
+                <a16:creationId xmlns:a16="http://schemas.microsoft.com/office/drawing/2014/main" id="{10B6AF64-4117-A6B8-E415-87463B64031A}"/>
               </a:ext>
             </a:extLst>
           </p:cNvPr>
@@ -2199,7 +2204,7 @@
           <p:cNvPr id="3" name="Content Placeholder 2">
             <a:extLst>
               <a:ext uri="{FF2B5EF4-FFF2-40B4-BE49-F238E27FC236}">
-                <a16:creationId xmlns:a16="http://schemas.microsoft.com/office/drawing/2014/main" id="{6ED2725E-774F-92F8-975B-CA3E84B30184}"/>
+                <a16:creationId xmlns:a16="http://schemas.microsoft.com/office/drawing/2014/main" id="{CD91A4C3-6AA5-EB81-0DA1-DAF8CFFDFF26}"/>
               </a:ext>
             </a:extLst>
           </p:cNvPr>
@@ -2289,7 +2294,7 @@
           <p:cNvPr id="4" name="Text Placeholder 3">
             <a:extLst>
               <a:ext uri="{FF2B5EF4-FFF2-40B4-BE49-F238E27FC236}">
-                <a16:creationId xmlns:a16="http://schemas.microsoft.com/office/drawing/2014/main" id="{FDC3B6BD-B205-B414-0E80-AE9927445229}"/>
+                <a16:creationId xmlns:a16="http://schemas.microsoft.com/office/drawing/2014/main" id="{B10E4372-80F8-FABE-BE95-69CC4CBDAAE4}"/>
               </a:ext>
             </a:extLst>
           </p:cNvPr>
@@ -2360,7 +2365,7 @@
           <p:cNvPr id="5" name="Date Placeholder 4">
             <a:extLst>
               <a:ext uri="{FF2B5EF4-FFF2-40B4-BE49-F238E27FC236}">
-                <a16:creationId xmlns:a16="http://schemas.microsoft.com/office/drawing/2014/main" id="{2E8A6375-9F8D-AE2B-38AD-94DFA9AB40D9}"/>
+                <a16:creationId xmlns:a16="http://schemas.microsoft.com/office/drawing/2014/main" id="{8B0A4BA9-E324-E3E8-EEDE-7522622B9543}"/>
               </a:ext>
             </a:extLst>
           </p:cNvPr>
@@ -2378,7 +2383,7 @@
           <a:p>
             <a:fld id="{04973CAB-4A2E-42F7-97F5-9897F8AE48EC}" type="datetimeFigureOut">
               <a:rPr lang="en-US" smtClean="0"/>
-              <a:t>11/3/2023</a:t>
+              <a:t>11/6/23</a:t>
             </a:fld>
             <a:endParaRPr lang="en-US"/>
           </a:p>
@@ -2389,7 +2394,7 @@
           <p:cNvPr id="6" name="Footer Placeholder 5">
             <a:extLst>
               <a:ext uri="{FF2B5EF4-FFF2-40B4-BE49-F238E27FC236}">
-                <a16:creationId xmlns:a16="http://schemas.microsoft.com/office/drawing/2014/main" id="{46C4735C-9403-A6DA-47E5-D8C46A640788}"/>
+                <a16:creationId xmlns:a16="http://schemas.microsoft.com/office/drawing/2014/main" id="{43060040-27DF-D64C-37E7-F482C41B1591}"/>
               </a:ext>
             </a:extLst>
           </p:cNvPr>
@@ -2414,7 +2419,7 @@
           <p:cNvPr id="7" name="Slide Number Placeholder 6">
             <a:extLst>
               <a:ext uri="{FF2B5EF4-FFF2-40B4-BE49-F238E27FC236}">
-                <a16:creationId xmlns:a16="http://schemas.microsoft.com/office/drawing/2014/main" id="{010A51E2-33A6-4A4A-1015-176B58B6E60D}"/>
+                <a16:creationId xmlns:a16="http://schemas.microsoft.com/office/drawing/2014/main" id="{5EB4731C-0292-57E4-37E3-B5ED5C4C32FA}"/>
               </a:ext>
             </a:extLst>
           </p:cNvPr>
@@ -2441,7 +2446,7 @@
     </p:spTree>
     <p:extLst>
       <p:ext uri="{BB962C8B-B14F-4D97-AF65-F5344CB8AC3E}">
-        <p14:creationId xmlns:p14="http://schemas.microsoft.com/office/powerpoint/2010/main" val="1604813102"/>
+        <p14:creationId xmlns:p14="http://schemas.microsoft.com/office/powerpoint/2010/main" val="1849694855"/>
       </p:ext>
     </p:extLst>
   </p:cSld>
@@ -2473,7 +2478,7 @@
           <p:cNvPr id="2" name="Title 1">
             <a:extLst>
               <a:ext uri="{FF2B5EF4-FFF2-40B4-BE49-F238E27FC236}">
-                <a16:creationId xmlns:a16="http://schemas.microsoft.com/office/drawing/2014/main" id="{83CFC27A-3D90-6397-BEF0-81656597DFFF}"/>
+                <a16:creationId xmlns:a16="http://schemas.microsoft.com/office/drawing/2014/main" id="{37DA3E41-9F2C-F38C-21DC-BA5995436CC6}"/>
               </a:ext>
             </a:extLst>
           </p:cNvPr>
@@ -2510,7 +2515,7 @@
           <p:cNvPr id="3" name="Picture Placeholder 2">
             <a:extLst>
               <a:ext uri="{FF2B5EF4-FFF2-40B4-BE49-F238E27FC236}">
-                <a16:creationId xmlns:a16="http://schemas.microsoft.com/office/drawing/2014/main" id="{35E8CA70-44F9-08EC-5F1E-942F5617E44A}"/>
+                <a16:creationId xmlns:a16="http://schemas.microsoft.com/office/drawing/2014/main" id="{07B30DF9-A773-984F-A3E5-D44BDB042C2F}"/>
               </a:ext>
             </a:extLst>
           </p:cNvPr>
@@ -2577,7 +2582,7 @@
           <p:cNvPr id="4" name="Text Placeholder 3">
             <a:extLst>
               <a:ext uri="{FF2B5EF4-FFF2-40B4-BE49-F238E27FC236}">
-                <a16:creationId xmlns:a16="http://schemas.microsoft.com/office/drawing/2014/main" id="{D04E38D4-A689-F540-7378-CDF11A4B3394}"/>
+                <a16:creationId xmlns:a16="http://schemas.microsoft.com/office/drawing/2014/main" id="{010A7305-F2E5-4BA6-06FA-E1B58A8D95B3}"/>
               </a:ext>
             </a:extLst>
           </p:cNvPr>
@@ -2648,7 +2653,7 @@
           <p:cNvPr id="5" name="Date Placeholder 4">
             <a:extLst>
               <a:ext uri="{FF2B5EF4-FFF2-40B4-BE49-F238E27FC236}">
-                <a16:creationId xmlns:a16="http://schemas.microsoft.com/office/drawing/2014/main" id="{97111C96-FB76-64F4-585E-757068803038}"/>
+                <a16:creationId xmlns:a16="http://schemas.microsoft.com/office/drawing/2014/main" id="{350CCEED-50F5-94EA-8A95-9BF2F700860D}"/>
               </a:ext>
             </a:extLst>
           </p:cNvPr>
@@ -2666,7 +2671,7 @@
           <a:p>
             <a:fld id="{04973CAB-4A2E-42F7-97F5-9897F8AE48EC}" type="datetimeFigureOut">
               <a:rPr lang="en-US" smtClean="0"/>
-              <a:t>11/3/2023</a:t>
+              <a:t>11/6/23</a:t>
             </a:fld>
             <a:endParaRPr lang="en-US"/>
           </a:p>
@@ -2677,7 +2682,7 @@
           <p:cNvPr id="6" name="Footer Placeholder 5">
             <a:extLst>
               <a:ext uri="{FF2B5EF4-FFF2-40B4-BE49-F238E27FC236}">
-                <a16:creationId xmlns:a16="http://schemas.microsoft.com/office/drawing/2014/main" id="{71E1CB4A-8A93-93FC-E73E-91875E9CB579}"/>
+                <a16:creationId xmlns:a16="http://schemas.microsoft.com/office/drawing/2014/main" id="{91BBF394-9123-3563-5298-5986F7868228}"/>
               </a:ext>
             </a:extLst>
           </p:cNvPr>
@@ -2702,7 +2707,7 @@
           <p:cNvPr id="7" name="Slide Number Placeholder 6">
             <a:extLst>
               <a:ext uri="{FF2B5EF4-FFF2-40B4-BE49-F238E27FC236}">
-                <a16:creationId xmlns:a16="http://schemas.microsoft.com/office/drawing/2014/main" id="{4F0C641A-154A-860A-6B4E-9EE20330DA8E}"/>
+                <a16:creationId xmlns:a16="http://schemas.microsoft.com/office/drawing/2014/main" id="{4635C964-0BFB-EF97-DE02-AFB164980E1C}"/>
               </a:ext>
             </a:extLst>
           </p:cNvPr>
@@ -2729,7 +2734,7 @@
     </p:spTree>
     <p:extLst>
       <p:ext uri="{BB962C8B-B14F-4D97-AF65-F5344CB8AC3E}">
-        <p14:creationId xmlns:p14="http://schemas.microsoft.com/office/powerpoint/2010/main" val="3385258664"/>
+        <p14:creationId xmlns:p14="http://schemas.microsoft.com/office/powerpoint/2010/main" val="615691765"/>
       </p:ext>
     </p:extLst>
   </p:cSld>
@@ -2766,7 +2771,7 @@
           <p:cNvPr id="2" name="Title Placeholder 1">
             <a:extLst>
               <a:ext uri="{FF2B5EF4-FFF2-40B4-BE49-F238E27FC236}">
-                <a16:creationId xmlns:a16="http://schemas.microsoft.com/office/drawing/2014/main" id="{7516D3FE-1348-36BB-8E1E-91A20BFFD0DB}"/>
+                <a16:creationId xmlns:a16="http://schemas.microsoft.com/office/drawing/2014/main" id="{A184FBAB-E244-E5D5-A7A2-9259EB3FE597}"/>
               </a:ext>
             </a:extLst>
           </p:cNvPr>
@@ -2804,7 +2809,7 @@
           <p:cNvPr id="3" name="Text Placeholder 2">
             <a:extLst>
               <a:ext uri="{FF2B5EF4-FFF2-40B4-BE49-F238E27FC236}">
-                <a16:creationId xmlns:a16="http://schemas.microsoft.com/office/drawing/2014/main" id="{EF937C9F-7C97-C777-CCBE-81448DBE44D7}"/>
+                <a16:creationId xmlns:a16="http://schemas.microsoft.com/office/drawing/2014/main" id="{B90F54AF-8401-5595-DEA5-67368EE56ADD}"/>
               </a:ext>
             </a:extLst>
           </p:cNvPr>
@@ -2871,7 +2876,7 @@
           <p:cNvPr id="4" name="Date Placeholder 3">
             <a:extLst>
               <a:ext uri="{FF2B5EF4-FFF2-40B4-BE49-F238E27FC236}">
-                <a16:creationId xmlns:a16="http://schemas.microsoft.com/office/drawing/2014/main" id="{AFDC8282-3B72-EA9D-9A56-73C507C4CCDE}"/>
+                <a16:creationId xmlns:a16="http://schemas.microsoft.com/office/drawing/2014/main" id="{C687F1BF-5A08-F31B-6D69-E2C7FBCAA0E0}"/>
               </a:ext>
             </a:extLst>
           </p:cNvPr>
@@ -2907,7 +2912,7 @@
           <a:p>
             <a:fld id="{04973CAB-4A2E-42F7-97F5-9897F8AE48EC}" type="datetimeFigureOut">
               <a:rPr lang="en-US" smtClean="0"/>
-              <a:t>11/3/2023</a:t>
+              <a:t>11/6/23</a:t>
             </a:fld>
             <a:endParaRPr lang="en-US"/>
           </a:p>
@@ -2918,7 +2923,7 @@
           <p:cNvPr id="5" name="Footer Placeholder 4">
             <a:extLst>
               <a:ext uri="{FF2B5EF4-FFF2-40B4-BE49-F238E27FC236}">
-                <a16:creationId xmlns:a16="http://schemas.microsoft.com/office/drawing/2014/main" id="{6F551E63-FEB9-1CD4-78F5-FB7710CA2485}"/>
+                <a16:creationId xmlns:a16="http://schemas.microsoft.com/office/drawing/2014/main" id="{35BFA35D-0A76-A7C7-9E31-407085175F2D}"/>
               </a:ext>
             </a:extLst>
           </p:cNvPr>
@@ -2961,7 +2966,7 @@
           <p:cNvPr id="6" name="Slide Number Placeholder 5">
             <a:extLst>
               <a:ext uri="{FF2B5EF4-FFF2-40B4-BE49-F238E27FC236}">
-                <a16:creationId xmlns:a16="http://schemas.microsoft.com/office/drawing/2014/main" id="{5066577A-B579-362B-1AEB-DA1A656798E2}"/>
+                <a16:creationId xmlns:a16="http://schemas.microsoft.com/office/drawing/2014/main" id="{E33F9C78-C092-28F9-B612-9FC485A30A41}"/>
               </a:ext>
             </a:extLst>
           </p:cNvPr>
@@ -3006,23 +3011,23 @@
     </p:spTree>
     <p:extLst>
       <p:ext uri="{BB962C8B-B14F-4D97-AF65-F5344CB8AC3E}">
-        <p14:creationId xmlns:p14="http://schemas.microsoft.com/office/powerpoint/2010/main" val="3390655312"/>
+        <p14:creationId xmlns:p14="http://schemas.microsoft.com/office/powerpoint/2010/main" val="1006284047"/>
       </p:ext>
     </p:extLst>
   </p:cSld>
   <p:clrMap bg1="lt1" tx1="dk1" bg2="lt2" tx2="dk2" accent1="accent1" accent2="accent2" accent3="accent3" accent4="accent4" accent5="accent5" accent6="accent6" hlink="hlink" folHlink="folHlink"/>
   <p:sldLayoutIdLst>
-    <p:sldLayoutId id="2147483649" r:id="rId1"/>
-    <p:sldLayoutId id="2147483650" r:id="rId2"/>
-    <p:sldLayoutId id="2147483651" r:id="rId3"/>
-    <p:sldLayoutId id="2147483652" r:id="rId4"/>
-    <p:sldLayoutId id="2147483653" r:id="rId5"/>
-    <p:sldLayoutId id="2147483654" r:id="rId6"/>
-    <p:sldLayoutId id="2147483655" r:id="rId7"/>
-    <p:sldLayoutId id="2147483656" r:id="rId8"/>
-    <p:sldLayoutId id="2147483657" r:id="rId9"/>
-    <p:sldLayoutId id="2147483658" r:id="rId10"/>
-    <p:sldLayoutId id="2147483659" r:id="rId11"/>
+    <p:sldLayoutId id="2147483769" r:id="rId1"/>
+    <p:sldLayoutId id="2147483770" r:id="rId2"/>
+    <p:sldLayoutId id="2147483771" r:id="rId3"/>
+    <p:sldLayoutId id="2147483772" r:id="rId4"/>
+    <p:sldLayoutId id="2147483773" r:id="rId5"/>
+    <p:sldLayoutId id="2147483774" r:id="rId6"/>
+    <p:sldLayoutId id="2147483775" r:id="rId7"/>
+    <p:sldLayoutId id="2147483776" r:id="rId8"/>
+    <p:sldLayoutId id="2147483777" r:id="rId9"/>
+    <p:sldLayoutId id="2147483778" r:id="rId10"/>
+    <p:sldLayoutId id="2147483779" r:id="rId11"/>
   </p:sldLayoutIdLst>
   <p:txStyles>
     <p:titleStyle>
@@ -3310,6 +3315,41 @@
 <file path=ppt/slides/slide1.xml><?xml version="1.0" encoding="utf-8"?>
 <p:sld xmlns:a="http://schemas.openxmlformats.org/drawingml/2006/main" xmlns:r="http://schemas.openxmlformats.org/officeDocument/2006/relationships" xmlns:p="http://schemas.openxmlformats.org/presentationml/2006/main">
   <p:cSld>
+    <p:bg>
+      <p:bgPr>
+        <a:gradFill flip="none" rotWithShape="1">
+          <a:gsLst>
+            <a:gs pos="0">
+              <a:schemeClr val="accent5">
+                <a:lumMod val="5000"/>
+                <a:lumOff val="95000"/>
+              </a:schemeClr>
+            </a:gs>
+            <a:gs pos="74000">
+              <a:schemeClr val="accent5">
+                <a:lumMod val="45000"/>
+                <a:lumOff val="55000"/>
+              </a:schemeClr>
+            </a:gs>
+            <a:gs pos="83000">
+              <a:schemeClr val="accent5">
+                <a:lumMod val="45000"/>
+                <a:lumOff val="55000"/>
+              </a:schemeClr>
+            </a:gs>
+            <a:gs pos="100000">
+              <a:schemeClr val="accent5">
+                <a:lumMod val="30000"/>
+                <a:lumOff val="70000"/>
+              </a:schemeClr>
+            </a:gs>
+          </a:gsLst>
+          <a:lin ang="5400000" scaled="1"/>
+          <a:tileRect/>
+        </a:gradFill>
+        <a:effectLst/>
+      </p:bgPr>
+    </p:bg>
     <p:spTree>
       <p:nvGrpSpPr>
         <p:cNvPr id="1" name=""/>
@@ -3340,13 +3380,26 @@
             <p:ph type="ctrTitle"/>
           </p:nvPr>
         </p:nvSpPr>
-        <p:spPr/>
-        <p:txBody>
-          <a:bodyPr/>
-          <a:lstStyle/>
-          <a:p>
-            <a:r>
-              <a:rPr lang="en-US" dirty="0"/>
+        <p:spPr>
+          <a:xfrm>
+            <a:off x="965199" y="885433"/>
+            <a:ext cx="10261602" cy="3022257"/>
+          </a:xfrm>
+          <a:effectLst/>
+        </p:spPr>
+        <p:txBody>
+          <a:bodyPr anchor="b">
+            <a:normAutofit/>
+          </a:bodyPr>
+          <a:lstStyle/>
+          <a:p>
+            <a:pPr algn="ctr"/>
+            <a:r>
+              <a:rPr lang="en-US" sz="7200">
+                <a:solidFill>
+                  <a:schemeClr val="tx1"/>
+                </a:solidFill>
+              </a:rPr>
               <a:t>IRIS Feature Engineering</a:t>
             </a:r>
           </a:p>
@@ -3368,13 +3421,22 @@
             <p:ph type="subTitle" idx="1"/>
           </p:nvPr>
         </p:nvSpPr>
-        <p:spPr/>
-        <p:txBody>
-          <a:bodyPr/>
-          <a:lstStyle/>
-          <a:p>
-            <a:r>
-              <a:rPr lang="en-US" dirty="0"/>
+        <p:spPr>
+          <a:xfrm>
+            <a:off x="1906955" y="4033164"/>
+            <a:ext cx="8378090" cy="1181206"/>
+          </a:xfrm>
+          <a:effectLst/>
+        </p:spPr>
+        <p:txBody>
+          <a:bodyPr anchor="t">
+            <a:normAutofit/>
+          </a:bodyPr>
+          <a:lstStyle/>
+          <a:p>
+            <a:pPr algn="ctr"/>
+            <a:r>
+              <a:rPr lang="en-US" sz="2000"/>
               <a:t>By Anthony and Bennett</a:t>
             </a:r>
           </a:p>
@@ -3388,7 +3450,7 @@
     </p:extLst>
   </p:cSld>
   <p:clrMapOvr>
-    <a:masterClrMapping/>
+    <a:overrideClrMapping bg1="lt1" tx1="dk1" bg2="lt2" tx2="dk2" accent1="accent1" accent2="accent2" accent3="accent3" accent4="accent4" accent5="accent5" accent6="accent6" hlink="hlink" folHlink="folHlink"/>
   </p:clrMapOvr>
 </p:sld>
 </file>
@@ -3396,6 +3458,41 @@
 <file path=ppt/slides/slide2.xml><?xml version="1.0" encoding="utf-8"?>
 <p:sld xmlns:a="http://schemas.openxmlformats.org/drawingml/2006/main" xmlns:r="http://schemas.openxmlformats.org/officeDocument/2006/relationships" xmlns:p="http://schemas.openxmlformats.org/presentationml/2006/main">
   <p:cSld>
+    <p:bg>
+      <p:bgPr>
+        <a:gradFill flip="none" rotWithShape="1">
+          <a:gsLst>
+            <a:gs pos="0">
+              <a:schemeClr val="accent5">
+                <a:lumMod val="5000"/>
+                <a:lumOff val="95000"/>
+              </a:schemeClr>
+            </a:gs>
+            <a:gs pos="74000">
+              <a:schemeClr val="accent5">
+                <a:lumMod val="45000"/>
+                <a:lumOff val="55000"/>
+              </a:schemeClr>
+            </a:gs>
+            <a:gs pos="83000">
+              <a:schemeClr val="accent5">
+                <a:lumMod val="45000"/>
+                <a:lumOff val="55000"/>
+              </a:schemeClr>
+            </a:gs>
+            <a:gs pos="100000">
+              <a:schemeClr val="accent5">
+                <a:lumMod val="30000"/>
+                <a:lumOff val="70000"/>
+              </a:schemeClr>
+            </a:gs>
+          </a:gsLst>
+          <a:lin ang="5400000" scaled="1"/>
+          <a:tileRect/>
+        </a:gradFill>
+        <a:effectLst/>
+      </p:bgPr>
+    </p:bg>
     <p:spTree>
       <p:nvGrpSpPr>
         <p:cNvPr id="1" name=""/>
@@ -3454,7 +3551,12 @@
             <p:ph idx="1"/>
           </p:nvPr>
         </p:nvSpPr>
-        <p:spPr/>
+        <p:spPr>
+          <a:xfrm>
+            <a:off x="152400" y="1405495"/>
+            <a:ext cx="6934200" cy="4351338"/>
+          </a:xfrm>
+        </p:spPr>
         <p:txBody>
           <a:bodyPr/>
           <a:lstStyle/>
@@ -3505,6 +3607,53 @@
           </a:p>
         </p:txBody>
       </p:sp>
+      <p:pic>
+        <p:nvPicPr>
+          <p:cNvPr id="1026" name="Picture 2" descr="IRIS Flowers Classification Using Machine Learning - Analytics Vidhya">
+            <a:extLst>
+              <a:ext uri="{FF2B5EF4-FFF2-40B4-BE49-F238E27FC236}">
+                <a16:creationId xmlns:a16="http://schemas.microsoft.com/office/drawing/2014/main" id="{B4709FB5-5C71-4589-4F77-62351B6AEB8A}"/>
+              </a:ext>
+            </a:extLst>
+          </p:cNvPr>
+          <p:cNvPicPr>
+            <a:picLocks noChangeAspect="1" noChangeArrowheads="1"/>
+          </p:cNvPicPr>
+          <p:nvPr/>
+        </p:nvPicPr>
+        <p:blipFill>
+          <a:blip r:embed="rId2">
+            <a:extLst>
+              <a:ext uri="{28A0092B-C50C-407E-A947-70E740481C1C}">
+                <a14:useLocalDpi xmlns:a14="http://schemas.microsoft.com/office/drawing/2010/main" val="0"/>
+              </a:ext>
+            </a:extLst>
+          </a:blip>
+          <a:srcRect/>
+          <a:stretch>
+            <a:fillRect/>
+          </a:stretch>
+        </p:blipFill>
+        <p:spPr bwMode="auto">
+          <a:xfrm>
+            <a:off x="7086600" y="2037963"/>
+            <a:ext cx="4845866" cy="2163333"/>
+          </a:xfrm>
+          <a:prstGeom prst="rect">
+            <a:avLst/>
+          </a:prstGeom>
+          <a:noFill/>
+          <a:extLst>
+            <a:ext uri="{909E8E84-426E-40DD-AFC4-6F175D3DCCD1}">
+              <a14:hiddenFill xmlns:a14="http://schemas.microsoft.com/office/drawing/2010/main">
+                <a:solidFill>
+                  <a:srgbClr val="FFFFFF"/>
+                </a:solidFill>
+              </a14:hiddenFill>
+            </a:ext>
+          </a:extLst>
+        </p:spPr>
+      </p:pic>
     </p:spTree>
     <p:extLst>
       <p:ext uri="{BB962C8B-B14F-4D97-AF65-F5344CB8AC3E}">
@@ -3521,6 +3670,41 @@
 <file path=ppt/slides/slide3.xml><?xml version="1.0" encoding="utf-8"?>
 <p:sld xmlns:a="http://schemas.openxmlformats.org/drawingml/2006/main" xmlns:r="http://schemas.openxmlformats.org/officeDocument/2006/relationships" xmlns:p="http://schemas.openxmlformats.org/presentationml/2006/main">
   <p:cSld>
+    <p:bg>
+      <p:bgPr>
+        <a:gradFill flip="none" rotWithShape="1">
+          <a:gsLst>
+            <a:gs pos="0">
+              <a:schemeClr val="accent5">
+                <a:lumMod val="5000"/>
+                <a:lumOff val="95000"/>
+              </a:schemeClr>
+            </a:gs>
+            <a:gs pos="74000">
+              <a:schemeClr val="accent5">
+                <a:lumMod val="45000"/>
+                <a:lumOff val="55000"/>
+              </a:schemeClr>
+            </a:gs>
+            <a:gs pos="83000">
+              <a:schemeClr val="accent5">
+                <a:lumMod val="45000"/>
+                <a:lumOff val="55000"/>
+              </a:schemeClr>
+            </a:gs>
+            <a:gs pos="100000">
+              <a:schemeClr val="accent5">
+                <a:lumMod val="30000"/>
+                <a:lumOff val="70000"/>
+              </a:schemeClr>
+            </a:gs>
+          </a:gsLst>
+          <a:lin ang="5400000" scaled="1"/>
+          <a:tileRect/>
+        </a:gradFill>
+        <a:effectLst/>
+      </p:bgPr>
+    </p:bg>
     <p:spTree>
       <p:nvGrpSpPr>
         <p:cNvPr id="1" name=""/>
@@ -3579,9 +3763,16 @@
             <p:ph idx="1"/>
           </p:nvPr>
         </p:nvSpPr>
-        <p:spPr/>
-        <p:txBody>
-          <a:bodyPr/>
+        <p:spPr>
+          <a:xfrm>
+            <a:off x="838200" y="1825625"/>
+            <a:ext cx="6884773" cy="4351338"/>
+          </a:xfrm>
+        </p:spPr>
+        <p:txBody>
+          <a:bodyPr>
+            <a:normAutofit lnSpcReduction="10000"/>
+          </a:bodyPr>
           <a:lstStyle/>
           <a:p>
             <a:r>
@@ -3606,6 +3797,20 @@
           <a:p>
             <a:r>
               <a:rPr lang="en-US" dirty="0"/>
+              <a:t>Dimensionality reduction/transformations (PCA, LDA, </a:t>
+            </a:r>
+            <a:r>
+              <a:rPr lang="en-US" dirty="0" err="1"/>
+              <a:t>tSNE</a:t>
+            </a:r>
+            <a:r>
+              <a:rPr lang="en-US" dirty="0"/>
+              <a:t>)</a:t>
+            </a:r>
+          </a:p>
+          <a:p>
+            <a:r>
+              <a:rPr lang="en-US" dirty="0"/>
               <a:t>See if any of these improve performance of methods</a:t>
             </a:r>
           </a:p>
@@ -3617,6 +3822,53 @@
           </a:p>
         </p:txBody>
       </p:sp>
+      <p:pic>
+        <p:nvPicPr>
+          <p:cNvPr id="2050" name="Picture 2" descr="Iris flower data set - Wikipedia">
+            <a:extLst>
+              <a:ext uri="{FF2B5EF4-FFF2-40B4-BE49-F238E27FC236}">
+                <a16:creationId xmlns:a16="http://schemas.microsoft.com/office/drawing/2014/main" id="{76EB35C1-1632-45D7-1213-980B0C5707B0}"/>
+              </a:ext>
+            </a:extLst>
+          </p:cNvPr>
+          <p:cNvPicPr>
+            <a:picLocks noChangeAspect="1" noChangeArrowheads="1"/>
+          </p:cNvPicPr>
+          <p:nvPr/>
+        </p:nvPicPr>
+        <p:blipFill>
+          <a:blip r:embed="rId2">
+            <a:extLst>
+              <a:ext uri="{28A0092B-C50C-407E-A947-70E740481C1C}">
+                <a14:useLocalDpi xmlns:a14="http://schemas.microsoft.com/office/drawing/2010/main" val="0"/>
+              </a:ext>
+            </a:extLst>
+          </a:blip>
+          <a:srcRect/>
+          <a:stretch>
+            <a:fillRect/>
+          </a:stretch>
+        </p:blipFill>
+        <p:spPr bwMode="auto">
+          <a:xfrm>
+            <a:off x="7722973" y="1690688"/>
+            <a:ext cx="4351338" cy="4351338"/>
+          </a:xfrm>
+          <a:prstGeom prst="rect">
+            <a:avLst/>
+          </a:prstGeom>
+          <a:noFill/>
+          <a:extLst>
+            <a:ext uri="{909E8E84-426E-40DD-AFC4-6F175D3DCCD1}">
+              <a14:hiddenFill xmlns:a14="http://schemas.microsoft.com/office/drawing/2010/main">
+                <a:solidFill>
+                  <a:srgbClr val="FFFFFF"/>
+                </a:solidFill>
+              </a14:hiddenFill>
+            </a:ext>
+          </a:extLst>
+        </p:spPr>
+      </p:pic>
     </p:spTree>
     <p:extLst>
       <p:ext uri="{BB962C8B-B14F-4D97-AF65-F5344CB8AC3E}">
@@ -3633,6 +3885,41 @@
 <file path=ppt/slides/slide4.xml><?xml version="1.0" encoding="utf-8"?>
 <p:sld xmlns:a="http://schemas.openxmlformats.org/drawingml/2006/main" xmlns:r="http://schemas.openxmlformats.org/officeDocument/2006/relationships" xmlns:p="http://schemas.openxmlformats.org/presentationml/2006/main">
   <p:cSld>
+    <p:bg>
+      <p:bgPr>
+        <a:gradFill flip="none" rotWithShape="1">
+          <a:gsLst>
+            <a:gs pos="0">
+              <a:schemeClr val="accent5">
+                <a:lumMod val="5000"/>
+                <a:lumOff val="95000"/>
+              </a:schemeClr>
+            </a:gs>
+            <a:gs pos="74000">
+              <a:schemeClr val="accent5">
+                <a:lumMod val="45000"/>
+                <a:lumOff val="55000"/>
+              </a:schemeClr>
+            </a:gs>
+            <a:gs pos="83000">
+              <a:schemeClr val="accent5">
+                <a:lumMod val="45000"/>
+                <a:lumOff val="55000"/>
+              </a:schemeClr>
+            </a:gs>
+            <a:gs pos="100000">
+              <a:schemeClr val="accent5">
+                <a:lumMod val="30000"/>
+                <a:lumOff val="70000"/>
+              </a:schemeClr>
+            </a:gs>
+          </a:gsLst>
+          <a:lin ang="5400000" scaled="1"/>
+          <a:tileRect/>
+        </a:gradFill>
+        <a:effectLst/>
+      </p:bgPr>
+    </p:bg>
     <p:spTree>
       <p:nvGrpSpPr>
         <p:cNvPr id="1" name=""/>

</xml_diff>